<commit_message>
Ajout de quelques sources et quelques diapositives
</commit_message>
<xml_diff>
--- a/Commun/PrésentationPowerPoint.pptx
+++ b/Commun/PrésentationPowerPoint.pptx
@@ -12,7 +12,10 @@
     <p:sldId id="260" r:id="rId6"/>
     <p:sldId id="261" r:id="rId7"/>
     <p:sldId id="262" r:id="rId8"/>
-    <p:sldId id="263" r:id="rId9"/>
+    <p:sldId id="266" r:id="rId9"/>
+    <p:sldId id="267" r:id="rId10"/>
+    <p:sldId id="268" r:id="rId11"/>
+    <p:sldId id="263" r:id="rId12"/>
   </p:sldIdLst>
   <p:sldSz cx="12192000" cy="6858000"/>
   <p:notesSz cx="6858000" cy="9144000"/>
@@ -458,7 +461,7 @@
           <a:p>
             <a:fld id="{285030BD-A9CB-4642-A2F7-CBDDFBEFA093}" type="datetimeFigureOut">
               <a:rPr lang="fr-CA" smtClean="0"/>
-              <a:t>2017-05-05</a:t>
+              <a:t>2017-05-07</a:t>
             </a:fld>
             <a:endParaRPr lang="fr-CA"/>
           </a:p>
@@ -1546,7 +1549,7 @@
           <a:p>
             <a:fld id="{285030BD-A9CB-4642-A2F7-CBDDFBEFA093}" type="datetimeFigureOut">
               <a:rPr lang="fr-CA" smtClean="0"/>
-              <a:t>2017-05-05</a:t>
+              <a:t>2017-05-07</a:t>
             </a:fld>
             <a:endParaRPr lang="fr-CA"/>
           </a:p>
@@ -2526,7 +2529,7 @@
           <a:p>
             <a:fld id="{285030BD-A9CB-4642-A2F7-CBDDFBEFA093}" type="datetimeFigureOut">
               <a:rPr lang="fr-CA" smtClean="0"/>
-              <a:t>2017-05-05</a:t>
+              <a:t>2017-05-07</a:t>
             </a:fld>
             <a:endParaRPr lang="fr-CA"/>
           </a:p>
@@ -3660,7 +3663,7 @@
           <a:p>
             <a:fld id="{285030BD-A9CB-4642-A2F7-CBDDFBEFA093}" type="datetimeFigureOut">
               <a:rPr lang="fr-CA" smtClean="0"/>
-              <a:t>2017-05-05</a:t>
+              <a:t>2017-05-07</a:t>
             </a:fld>
             <a:endParaRPr lang="fr-CA"/>
           </a:p>
@@ -4693,7 +4696,7 @@
           <a:p>
             <a:fld id="{285030BD-A9CB-4642-A2F7-CBDDFBEFA093}" type="datetimeFigureOut">
               <a:rPr lang="fr-CA" smtClean="0"/>
-              <a:t>2017-05-05</a:t>
+              <a:t>2017-05-07</a:t>
             </a:fld>
             <a:endParaRPr lang="fr-CA"/>
           </a:p>
@@ -5353,7 +5356,7 @@
           <a:p>
             <a:fld id="{285030BD-A9CB-4642-A2F7-CBDDFBEFA093}" type="datetimeFigureOut">
               <a:rPr lang="fr-CA" smtClean="0"/>
-              <a:t>2017-05-05</a:t>
+              <a:t>2017-05-07</a:t>
             </a:fld>
             <a:endParaRPr lang="fr-CA"/>
           </a:p>
@@ -6214,7 +6217,7 @@
           <a:p>
             <a:fld id="{285030BD-A9CB-4642-A2F7-CBDDFBEFA093}" type="datetimeFigureOut">
               <a:rPr lang="fr-CA" smtClean="0"/>
-              <a:t>2017-05-05</a:t>
+              <a:t>2017-05-07</a:t>
             </a:fld>
             <a:endParaRPr lang="fr-CA"/>
           </a:p>
@@ -6404,7 +6407,7 @@
           <a:p>
             <a:fld id="{285030BD-A9CB-4642-A2F7-CBDDFBEFA093}" type="datetimeFigureOut">
               <a:rPr lang="fr-CA" smtClean="0"/>
-              <a:t>2017-05-05</a:t>
+              <a:t>2017-05-07</a:t>
             </a:fld>
             <a:endParaRPr lang="fr-CA"/>
           </a:p>
@@ -7376,7 +7379,7 @@
           <a:p>
             <a:fld id="{285030BD-A9CB-4642-A2F7-CBDDFBEFA093}" type="datetimeFigureOut">
               <a:rPr lang="fr-CA" smtClean="0"/>
-              <a:t>2017-05-05</a:t>
+              <a:t>2017-05-07</a:t>
             </a:fld>
             <a:endParaRPr lang="fr-CA"/>
           </a:p>
@@ -7587,7 +7590,7 @@
           <a:p>
             <a:fld id="{285030BD-A9CB-4642-A2F7-CBDDFBEFA093}" type="datetimeFigureOut">
               <a:rPr lang="fr-CA" smtClean="0"/>
-              <a:t>2017-05-05</a:t>
+              <a:t>2017-05-07</a:t>
             </a:fld>
             <a:endParaRPr lang="fr-CA"/>
           </a:p>
@@ -8621,7 +8624,7 @@
           <a:p>
             <a:fld id="{285030BD-A9CB-4642-A2F7-CBDDFBEFA093}" type="datetimeFigureOut">
               <a:rPr lang="fr-CA" smtClean="0"/>
-              <a:t>2017-05-05</a:t>
+              <a:t>2017-05-07</a:t>
             </a:fld>
             <a:endParaRPr lang="fr-CA"/>
           </a:p>
@@ -8893,7 +8896,7 @@
           <a:p>
             <a:fld id="{285030BD-A9CB-4642-A2F7-CBDDFBEFA093}" type="datetimeFigureOut">
               <a:rPr lang="fr-CA" smtClean="0"/>
-              <a:t>2017-05-05</a:t>
+              <a:t>2017-05-07</a:t>
             </a:fld>
             <a:endParaRPr lang="fr-CA"/>
           </a:p>
@@ -9303,7 +9306,7 @@
           <a:p>
             <a:fld id="{285030BD-A9CB-4642-A2F7-CBDDFBEFA093}" type="datetimeFigureOut">
               <a:rPr lang="fr-CA" smtClean="0"/>
-              <a:t>2017-05-05</a:t>
+              <a:t>2017-05-07</a:t>
             </a:fld>
             <a:endParaRPr lang="fr-CA"/>
           </a:p>
@@ -9430,7 +9433,7 @@
           <a:p>
             <a:fld id="{285030BD-A9CB-4642-A2F7-CBDDFBEFA093}" type="datetimeFigureOut">
               <a:rPr lang="fr-CA" smtClean="0"/>
-              <a:t>2017-05-05</a:t>
+              <a:t>2017-05-07</a:t>
             </a:fld>
             <a:endParaRPr lang="fr-CA"/>
           </a:p>
@@ -9525,7 +9528,7 @@
           <a:p>
             <a:fld id="{285030BD-A9CB-4642-A2F7-CBDDFBEFA093}" type="datetimeFigureOut">
               <a:rPr lang="fr-CA" smtClean="0"/>
-              <a:t>2017-05-05</a:t>
+              <a:t>2017-05-07</a:t>
             </a:fld>
             <a:endParaRPr lang="fr-CA"/>
           </a:p>
@@ -10606,7 +10609,7 @@
           <a:p>
             <a:fld id="{285030BD-A9CB-4642-A2F7-CBDDFBEFA093}" type="datetimeFigureOut">
               <a:rPr lang="fr-CA" smtClean="0"/>
-              <a:t>2017-05-05</a:t>
+              <a:t>2017-05-07</a:t>
             </a:fld>
             <a:endParaRPr lang="fr-CA"/>
           </a:p>
@@ -11714,7 +11717,7 @@
           <a:p>
             <a:fld id="{285030BD-A9CB-4642-A2F7-CBDDFBEFA093}" type="datetimeFigureOut">
               <a:rPr lang="fr-CA" smtClean="0"/>
-              <a:t>2017-05-05</a:t>
+              <a:t>2017-05-07</a:t>
             </a:fld>
             <a:endParaRPr lang="fr-CA"/>
           </a:p>
@@ -12711,7 +12714,7 @@
           <a:p>
             <a:fld id="{285030BD-A9CB-4642-A2F7-CBDDFBEFA093}" type="datetimeFigureOut">
               <a:rPr lang="fr-CA" smtClean="0"/>
-              <a:t>2017-05-05</a:t>
+              <a:t>2017-05-07</a:t>
             </a:fld>
             <a:endParaRPr lang="fr-CA"/>
           </a:p>
@@ -13386,6 +13389,164 @@
 </p:sld>
 </file>
 
+<file path=ppt/slides/slide10.xml><?xml version="1.0" encoding="utf-8"?>
+<p:sld xmlns:a="http://schemas.openxmlformats.org/drawingml/2006/main" xmlns:r="http://schemas.openxmlformats.org/officeDocument/2006/relationships" xmlns:p="http://schemas.openxmlformats.org/presentationml/2006/main">
+  <p:cSld>
+    <p:spTree>
+      <p:nvGrpSpPr>
+        <p:cNvPr id="1" name=""/>
+        <p:cNvGrpSpPr/>
+        <p:nvPr/>
+      </p:nvGrpSpPr>
+      <p:grpSpPr>
+        <a:xfrm>
+          <a:off x="0" y="0"/>
+          <a:ext cx="0" cy="0"/>
+          <a:chOff x="0" y="0"/>
+          <a:chExt cx="0" cy="0"/>
+        </a:xfrm>
+      </p:grpSpPr>
+      <p:pic>
+        <p:nvPicPr>
+          <p:cNvPr id="2" name="Image 1"/>
+          <p:cNvPicPr>
+            <a:picLocks noChangeAspect="1"/>
+          </p:cNvPicPr>
+          <p:nvPr/>
+        </p:nvPicPr>
+        <p:blipFill>
+          <a:blip r:embed="rId2"/>
+          <a:stretch>
+            <a:fillRect/>
+          </a:stretch>
+        </p:blipFill>
+        <p:spPr>
+          <a:xfrm>
+            <a:off x="1127457" y="304799"/>
+            <a:ext cx="10021805" cy="6376737"/>
+          </a:xfrm>
+          <a:prstGeom prst="rect">
+            <a:avLst/>
+          </a:prstGeom>
+        </p:spPr>
+      </p:pic>
+    </p:spTree>
+    <p:extLst>
+      <p:ext uri="{BB962C8B-B14F-4D97-AF65-F5344CB8AC3E}">
+        <p14:creationId xmlns:p14="http://schemas.microsoft.com/office/powerpoint/2010/main" val="2380555634"/>
+      </p:ext>
+    </p:extLst>
+  </p:cSld>
+  <p:clrMapOvr>
+    <a:masterClrMapping/>
+  </p:clrMapOvr>
+</p:sld>
+</file>
+
+<file path=ppt/slides/slide11.xml><?xml version="1.0" encoding="utf-8"?>
+<p:sld xmlns:a="http://schemas.openxmlformats.org/drawingml/2006/main" xmlns:r="http://schemas.openxmlformats.org/officeDocument/2006/relationships" xmlns:p="http://schemas.openxmlformats.org/presentationml/2006/main">
+  <p:cSld>
+    <p:spTree>
+      <p:nvGrpSpPr>
+        <p:cNvPr id="1" name=""/>
+        <p:cNvGrpSpPr/>
+        <p:nvPr/>
+      </p:nvGrpSpPr>
+      <p:grpSpPr>
+        <a:xfrm>
+          <a:off x="0" y="0"/>
+          <a:ext cx="0" cy="0"/>
+          <a:chOff x="0" y="0"/>
+          <a:chExt cx="0" cy="0"/>
+        </a:xfrm>
+      </p:grpSpPr>
+      <p:sp>
+        <p:nvSpPr>
+          <p:cNvPr id="2" name="Titre 1"/>
+          <p:cNvSpPr>
+            <a:spLocks noGrp="1"/>
+          </p:cNvSpPr>
+          <p:nvPr>
+            <p:ph type="title"/>
+          </p:nvPr>
+        </p:nvSpPr>
+        <p:spPr/>
+        <p:txBody>
+          <a:bodyPr/>
+          <a:lstStyle/>
+          <a:p>
+            <a:pPr algn="ctr"/>
+            <a:r>
+              <a:rPr lang="fr-CA" sz="5400" dirty="0"/>
+              <a:t>Conclusion</a:t>
+            </a:r>
+          </a:p>
+        </p:txBody>
+      </p:sp>
+      <p:sp>
+        <p:nvSpPr>
+          <p:cNvPr id="3" name="Espace réservé du contenu 2"/>
+          <p:cNvSpPr>
+            <a:spLocks noGrp="1"/>
+          </p:cNvSpPr>
+          <p:nvPr>
+            <p:ph idx="1"/>
+          </p:nvPr>
+        </p:nvSpPr>
+        <p:spPr/>
+        <p:txBody>
+          <a:bodyPr>
+            <a:normAutofit/>
+          </a:bodyPr>
+          <a:lstStyle/>
+          <a:p>
+            <a:r>
+              <a:rPr lang="fr-CA" sz="2400" dirty="0"/>
+              <a:t>Software</a:t>
+            </a:r>
+          </a:p>
+          <a:p>
+            <a:endParaRPr lang="fr-CA" sz="2400" dirty="0"/>
+          </a:p>
+          <a:p>
+            <a:r>
+              <a:rPr lang="fr-CA" sz="2400" dirty="0"/>
+              <a:t>Hardware</a:t>
+            </a:r>
+          </a:p>
+          <a:p>
+            <a:endParaRPr lang="fr-CA" sz="2400" dirty="0"/>
+          </a:p>
+          <a:p>
+            <a:r>
+              <a:rPr lang="fr-CA" sz="2400" dirty="0"/>
+              <a:t>Concurrents</a:t>
+            </a:r>
+          </a:p>
+          <a:p>
+            <a:endParaRPr lang="fr-CA" sz="2400" dirty="0"/>
+          </a:p>
+          <a:p>
+            <a:r>
+              <a:rPr lang="fr-CA" sz="2400" dirty="0"/>
+              <a:t>Communauté</a:t>
+            </a:r>
+          </a:p>
+        </p:txBody>
+      </p:sp>
+    </p:spTree>
+    <p:extLst>
+      <p:ext uri="{BB962C8B-B14F-4D97-AF65-F5344CB8AC3E}">
+        <p14:creationId xmlns:p14="http://schemas.microsoft.com/office/powerpoint/2010/main" val="2614008673"/>
+      </p:ext>
+    </p:extLst>
+  </p:cSld>
+  <p:clrMapOvr>
+    <a:masterClrMapping/>
+  </p:clrMapOvr>
+</p:sld>
+</file>
+
 <file path=ppt/slides/slide2.xml><?xml version="1.0" encoding="utf-8"?>
 <p:sld xmlns:a="http://schemas.openxmlformats.org/drawingml/2006/main" xmlns:r="http://schemas.openxmlformats.org/officeDocument/2006/relationships" xmlns:p="http://schemas.openxmlformats.org/presentationml/2006/main">
   <p:cSld>
@@ -13926,7 +14087,7 @@
           <a:graphicData uri="http://schemas.openxmlformats.org/presentationml/2006/ole">
             <mc:AlternateContent xmlns:mc="http://schemas.openxmlformats.org/markup-compatibility/2006">
               <mc:Choice xmlns:v="urn:schemas-microsoft-com:vml" Requires="v">
-                <p:oleObj spid="_x0000_s4103" name="Image" r:id="rId3" imgW="6971400" imgH="4809240" progId="Photoshop.Image.18">
+                <p:oleObj spid="_x0000_s4106" name="Image" r:id="rId3" imgW="6971400" imgH="4809240" progId="Photoshop.Image.18">
                   <p:embed/>
                 </p:oleObj>
               </mc:Choice>
@@ -14689,7 +14850,12 @@
             <p:ph idx="1"/>
           </p:nvPr>
         </p:nvSpPr>
-        <p:spPr/>
+        <p:spPr>
+          <a:xfrm>
+            <a:off x="1154954" y="2229853"/>
+            <a:ext cx="8825659" cy="4628147"/>
+          </a:xfrm>
+        </p:spPr>
         <p:txBody>
           <a:bodyPr>
             <a:noAutofit/>
@@ -14727,6 +14893,16 @@
               <a:rPr lang="fr-CA" sz="2500" dirty="0"/>
               <a:t>Ventes</a:t>
             </a:r>
+          </a:p>
+          <a:p>
+            <a:endParaRPr lang="fr-CA" sz="2500" dirty="0"/>
+          </a:p>
+          <a:p>
+            <a:r>
+              <a:rPr lang="fr-CA" sz="2500" dirty="0" err="1"/>
+              <a:t>Jams</a:t>
+            </a:r>
+            <a:endParaRPr lang="fr-CA" sz="2500" dirty="0"/>
           </a:p>
         </p:txBody>
       </p:sp>
@@ -14760,73 +14936,88 @@
           <a:chExt cx="0" cy="0"/>
         </a:xfrm>
       </p:grpSpPr>
-      <p:sp>
-        <p:nvSpPr>
-          <p:cNvPr id="2" name="Titre 1"/>
-          <p:cNvSpPr>
-            <a:spLocks noGrp="1"/>
-          </p:cNvSpPr>
-          <p:nvPr>
-            <p:ph type="title"/>
-          </p:nvPr>
-        </p:nvSpPr>
-        <p:spPr/>
-        <p:txBody>
-          <a:bodyPr/>
-          <a:lstStyle/>
-          <a:p>
-            <a:pPr algn="ctr"/>
-            <a:r>
-              <a:rPr lang="fr-CA" sz="5400" dirty="0"/>
-              <a:t>Conclusion</a:t>
-            </a:r>
-          </a:p>
-        </p:txBody>
-      </p:sp>
-      <p:sp>
-        <p:nvSpPr>
-          <p:cNvPr id="3" name="Espace réservé du contenu 2"/>
-          <p:cNvSpPr>
-            <a:spLocks noGrp="1"/>
-          </p:cNvSpPr>
-          <p:nvPr>
-            <p:ph idx="1"/>
-          </p:nvPr>
-        </p:nvSpPr>
-        <p:spPr/>
-        <p:txBody>
-          <a:bodyPr/>
-          <a:lstStyle/>
-          <a:p>
-            <a:r>
-              <a:rPr lang="fr-CA" dirty="0"/>
-              <a:t>Software</a:t>
-            </a:r>
-          </a:p>
-          <a:p>
-            <a:r>
-              <a:rPr lang="fr-CA" dirty="0"/>
-              <a:t>Hardware</a:t>
-            </a:r>
-          </a:p>
-          <a:p>
-            <a:r>
-              <a:rPr lang="fr-CA" dirty="0"/>
-              <a:t>Concurrents</a:t>
-            </a:r>
-          </a:p>
-          <a:p>
-            <a:r>
-              <a:rPr lang="fr-CA" dirty="0"/>
-              <a:t>Communauté</a:t>
-            </a:r>
-          </a:p>
-        </p:txBody>
-      </p:sp>
+      <p:pic>
+        <p:nvPicPr>
+          <p:cNvPr id="2" name="Image 1"/>
+          <p:cNvPicPr>
+            <a:picLocks noChangeAspect="1"/>
+          </p:cNvPicPr>
+          <p:nvPr/>
+        </p:nvPicPr>
+        <p:blipFill>
+          <a:blip r:embed="rId2"/>
+          <a:stretch>
+            <a:fillRect/>
+          </a:stretch>
+        </p:blipFill>
+        <p:spPr>
+          <a:xfrm>
+            <a:off x="1235242" y="413985"/>
+            <a:ext cx="9946106" cy="6123173"/>
+          </a:xfrm>
+          <a:prstGeom prst="rect">
+            <a:avLst/>
+          </a:prstGeom>
+        </p:spPr>
+      </p:pic>
     </p:spTree>
     <p:extLst>
       <p:ext uri="{BB962C8B-B14F-4D97-AF65-F5344CB8AC3E}">
-        <p14:creationId xmlns:p14="http://schemas.microsoft.com/office/powerpoint/2010/main" val="2614008673"/>
+        <p14:creationId xmlns:p14="http://schemas.microsoft.com/office/powerpoint/2010/main" val="1736121272"/>
+      </p:ext>
+    </p:extLst>
+  </p:cSld>
+  <p:clrMapOvr>
+    <a:masterClrMapping/>
+  </p:clrMapOvr>
+</p:sld>
+</file>
+
+<file path=ppt/slides/slide9.xml><?xml version="1.0" encoding="utf-8"?>
+<p:sld xmlns:a="http://schemas.openxmlformats.org/drawingml/2006/main" xmlns:r="http://schemas.openxmlformats.org/officeDocument/2006/relationships" xmlns:p="http://schemas.openxmlformats.org/presentationml/2006/main">
+  <p:cSld>
+    <p:spTree>
+      <p:nvGrpSpPr>
+        <p:cNvPr id="1" name=""/>
+        <p:cNvGrpSpPr/>
+        <p:nvPr/>
+      </p:nvGrpSpPr>
+      <p:grpSpPr>
+        <a:xfrm>
+          <a:off x="0" y="0"/>
+          <a:ext cx="0" cy="0"/>
+          <a:chOff x="0" y="0"/>
+          <a:chExt cx="0" cy="0"/>
+        </a:xfrm>
+      </p:grpSpPr>
+      <p:pic>
+        <p:nvPicPr>
+          <p:cNvPr id="2" name="Image 1"/>
+          <p:cNvPicPr>
+            <a:picLocks noChangeAspect="1"/>
+          </p:cNvPicPr>
+          <p:nvPr/>
+        </p:nvPicPr>
+        <p:blipFill>
+          <a:blip r:embed="rId2"/>
+          <a:stretch>
+            <a:fillRect/>
+          </a:stretch>
+        </p:blipFill>
+        <p:spPr>
+          <a:xfrm>
+            <a:off x="2079206" y="1"/>
+            <a:ext cx="7812297" cy="6858000"/>
+          </a:xfrm>
+          <a:prstGeom prst="rect">
+            <a:avLst/>
+          </a:prstGeom>
+        </p:spPr>
+      </p:pic>
+    </p:spTree>
+    <p:extLst>
+      <p:ext uri="{BB962C8B-B14F-4D97-AF65-F5344CB8AC3E}">
+        <p14:creationId xmlns:p14="http://schemas.microsoft.com/office/powerpoint/2010/main" val="1546020923"/>
       </p:ext>
     </p:extLst>
   </p:cSld>

</xml_diff>